<commit_message>
Updated presentation; began to use the actual code from happy-with-git-r
</commit_message>
<xml_diff>
--- a/Github_week_pres1.pptx
+++ b/Github_week_pres1.pptx
@@ -14,6 +14,9 @@
     <p:sldId id="262" r:id="rId8"/>
     <p:sldId id="263" r:id="rId9"/>
     <p:sldId id="264" r:id="rId10"/>
+    <p:sldId id="265" r:id="rId11"/>
+    <p:sldId id="266" r:id="rId12"/>
+    <p:sldId id="267" r:id="rId13"/>
   </p:sldIdLst>
   <p:sldSz cx="9144000" cy="6858000" type="screen4x3"/>
   <p:notesSz cx="6858000" cy="9144000"/>
@@ -3235,6 +3238,632 @@
 </p:sld>
 </file>
 
+<file path=ppt/slides/slide10.xml><?xml version="1.0" encoding="utf-8"?>
+<p:sld xmlns:a="http://schemas.openxmlformats.org/drawingml/2006/main" xmlns:r="http://schemas.openxmlformats.org/officeDocument/2006/relationships" xmlns:p="http://schemas.openxmlformats.org/presentationml/2006/main">
+  <p:cSld>
+    <p:spTree>
+      <p:nvGrpSpPr>
+        <p:cNvPr id="1" name=""/>
+        <p:cNvGrpSpPr/>
+        <p:nvPr/>
+      </p:nvGrpSpPr>
+      <p:grpSpPr>
+        <a:xfrm>
+          <a:off x="0" y="0"/>
+          <a:ext cx="0" cy="0"/>
+          <a:chOff x="0" y="0"/>
+          <a:chExt cx="0" cy="0"/>
+        </a:xfrm>
+      </p:grpSpPr>
+      <p:sp>
+        <p:nvSpPr>
+          <p:cNvPr id="2" name="Title 1"/>
+          <p:cNvSpPr>
+            <a:spLocks noGrp="1"/>
+          </p:cNvSpPr>
+          <p:nvPr>
+            <p:ph type="title"/>
+          </p:nvPr>
+        </p:nvSpPr>
+        <p:spPr/>
+        <p:txBody>
+          <a:bodyPr/>
+          <a:lstStyle/>
+          <a:p>
+            <a:pPr lvl="0" marL="0" indent="0">
+              <a:buNone/>
+            </a:pPr>
+            <a:r>
+              <a:rPr/>
+              <a:t>Happy</a:t>
+            </a:r>
+            <a:r>
+              <a:rPr/>
+              <a:t> </a:t>
+            </a:r>
+            <a:r>
+              <a:rPr/>
+              <a:t>Git</a:t>
+            </a:r>
+            <a:r>
+              <a:rPr/>
+              <a:t> </a:t>
+            </a:r>
+            <a:r>
+              <a:rPr/>
+              <a:t>and</a:t>
+            </a:r>
+            <a:r>
+              <a:rPr/>
+              <a:t> </a:t>
+            </a:r>
+            <a:r>
+              <a:rPr/>
+              <a:t>GtHub</a:t>
+            </a:r>
+            <a:r>
+              <a:rPr/>
+              <a:t> </a:t>
+            </a:r>
+            <a:r>
+              <a:rPr/>
+              <a:t>for</a:t>
+            </a:r>
+            <a:r>
+              <a:rPr/>
+              <a:t> </a:t>
+            </a:r>
+            <a:r>
+              <a:rPr/>
+              <a:t>the</a:t>
+            </a:r>
+            <a:r>
+              <a:rPr/>
+              <a:t> </a:t>
+            </a:r>
+            <a:r>
+              <a:rPr/>
+              <a:t>useR</a:t>
+            </a:r>
+          </a:p>
+        </p:txBody>
+      </p:sp>
+      <p:sp>
+        <p:nvSpPr>
+          <p:cNvPr id="3" name="Content Placeholder 2"/>
+          <p:cNvSpPr>
+            <a:spLocks noGrp="1"/>
+          </p:cNvSpPr>
+          <p:nvPr>
+            <p:ph idx="1"/>
+          </p:nvPr>
+        </p:nvSpPr>
+        <p:spPr/>
+        <p:txBody>
+          <a:bodyPr/>
+          <a:lstStyle/>
+          <a:p>
+            <a:pPr lvl="1"/>
+            <a:r>
+              <a:rPr/>
+              <a:t>Check on </a:t>
+            </a:r>
+            <a:r>
+              <a:rPr i="1"/>
+              <a:t>Section 1: Installation</a:t>
+            </a:r>
+          </a:p>
+          <a:p>
+            <a:pPr lvl="1"/>
+            <a:r>
+              <a:rPr/>
+              <a:t>You all should have</a:t>
+            </a:r>
+          </a:p>
+          <a:p>
+            <a:pPr lvl="2"/>
+            <a:r>
+              <a:rPr/>
+              <a:t>A GitHub account with an acceptable user name</a:t>
+            </a:r>
+          </a:p>
+          <a:p>
+            <a:pPr lvl="2"/>
+            <a:r>
+              <a:rPr/>
+              <a:t>Upgraded your RStudio to 4.0.3</a:t>
+            </a:r>
+          </a:p>
+          <a:p>
+            <a:pPr lvl="2"/>
+            <a:r>
+              <a:rPr/>
+              <a:t>Installed and introduced yourself to Git</a:t>
+            </a:r>
+          </a:p>
+        </p:txBody>
+      </p:sp>
+    </p:spTree>
+  </p:cSld>
+</p:sld>
+</file>
+
+<file path=ppt/slides/slide11.xml><?xml version="1.0" encoding="utf-8"?>
+<p:sld xmlns:a="http://schemas.openxmlformats.org/drawingml/2006/main" xmlns:r="http://schemas.openxmlformats.org/officeDocument/2006/relationships" xmlns:p="http://schemas.openxmlformats.org/presentationml/2006/main">
+  <p:cSld>
+    <p:spTree>
+      <p:nvGrpSpPr>
+        <p:cNvPr id="1" name=""/>
+        <p:cNvGrpSpPr/>
+        <p:nvPr/>
+      </p:nvGrpSpPr>
+      <p:grpSpPr>
+        <a:xfrm>
+          <a:off x="0" y="0"/>
+          <a:ext cx="0" cy="0"/>
+          <a:chOff x="0" y="0"/>
+          <a:chExt cx="0" cy="0"/>
+        </a:xfrm>
+      </p:grpSpPr>
+      <p:sp>
+        <p:nvSpPr>
+          <p:cNvPr id="2" name="Title 1"/>
+          <p:cNvSpPr>
+            <a:spLocks noGrp="1"/>
+          </p:cNvSpPr>
+          <p:nvPr>
+            <p:ph type="title"/>
+          </p:nvPr>
+        </p:nvSpPr>
+        <p:spPr/>
+        <p:txBody>
+          <a:bodyPr/>
+          <a:lstStyle/>
+          <a:p>
+            <a:pPr lvl="0" marL="0" indent="0">
+              <a:buNone/>
+            </a:pPr>
+            <a:r>
+              <a:rPr/>
+              <a:t>The</a:t>
+            </a:r>
+            <a:r>
+              <a:rPr/>
+              <a:t> </a:t>
+            </a:r>
+            <a:r>
+              <a:rPr/>
+              <a:t>Shell</a:t>
+            </a:r>
+          </a:p>
+        </p:txBody>
+      </p:sp>
+      <p:sp>
+        <p:nvSpPr>
+          <p:cNvPr id="3" name="Content Placeholder 2"/>
+          <p:cNvSpPr>
+            <a:spLocks noGrp="1"/>
+          </p:cNvSpPr>
+          <p:nvPr>
+            <p:ph idx="1"/>
+          </p:nvPr>
+        </p:nvSpPr>
+        <p:spPr/>
+        <p:txBody>
+          <a:bodyPr/>
+          <a:lstStyle/>
+          <a:p>
+            <a:pPr lvl="1"/>
+            <a:r>
+              <a:rPr/>
+              <a:t>The shell is a program that allows you to run programs on your computer</a:t>
+            </a:r>
+          </a:p>
+          <a:p>
+            <a:pPr lvl="2"/>
+            <a:r>
+              <a:rPr/>
+              <a:t>Similar to “terminal”, “command line”, and “console”</a:t>
+            </a:r>
+          </a:p>
+        </p:txBody>
+      </p:sp>
+    </p:spTree>
+  </p:cSld>
+</p:sld>
+</file>
+
+<file path=ppt/slides/slide12.xml><?xml version="1.0" encoding="utf-8"?>
+<p:sld xmlns:a="http://schemas.openxmlformats.org/drawingml/2006/main" xmlns:r="http://schemas.openxmlformats.org/officeDocument/2006/relationships" xmlns:p="http://schemas.openxmlformats.org/presentationml/2006/main">
+  <p:cSld>
+    <p:spTree>
+      <p:nvGrpSpPr>
+        <p:cNvPr id="1" name=""/>
+        <p:cNvGrpSpPr/>
+        <p:nvPr/>
+      </p:nvGrpSpPr>
+      <p:grpSpPr>
+        <a:xfrm>
+          <a:off x="0" y="0"/>
+          <a:ext cx="0" cy="0"/>
+          <a:chOff x="0" y="0"/>
+          <a:chExt cx="0" cy="0"/>
+        </a:xfrm>
+      </p:grpSpPr>
+      <p:sp>
+        <p:nvSpPr>
+          <p:cNvPr id="2" name="Title 1"/>
+          <p:cNvSpPr>
+            <a:spLocks noGrp="1"/>
+          </p:cNvSpPr>
+          <p:nvPr>
+            <p:ph type="title"/>
+          </p:nvPr>
+        </p:nvSpPr>
+        <p:spPr/>
+        <p:txBody>
+          <a:bodyPr/>
+          <a:lstStyle/>
+          <a:p>
+            <a:pPr lvl="0" marL="0" indent="0">
+              <a:buNone/>
+            </a:pPr>
+            <a:r>
+              <a:rPr/>
+              <a:t>Basic</a:t>
+            </a:r>
+            <a:r>
+              <a:rPr/>
+              <a:t> </a:t>
+            </a:r>
+            <a:r>
+              <a:rPr/>
+              <a:t>Shell</a:t>
+            </a:r>
+            <a:r>
+              <a:rPr/>
+              <a:t> </a:t>
+            </a:r>
+            <a:r>
+              <a:rPr/>
+              <a:t>Commands</a:t>
+            </a:r>
+          </a:p>
+        </p:txBody>
+      </p:sp>
+      <p:sp>
+        <p:nvSpPr>
+          <p:cNvPr id="3" name="Content Placeholder 2"/>
+          <p:cNvSpPr>
+            <a:spLocks noGrp="1"/>
+          </p:cNvSpPr>
+          <p:nvPr>
+            <p:ph idx="1"/>
+          </p:nvPr>
+        </p:nvSpPr>
+        <p:spPr/>
+        <p:txBody>
+          <a:bodyPr/>
+          <a:lstStyle/>
+          <a:p>
+            <a:pPr lvl="1"/>
+            <a:r>
+              <a:rPr sz="1800">
+                <a:hlinkClick r:id="rId2"/>
+                <a:latin typeface="Courier"/>
+              </a:rPr>
+              <a:t>pwd</a:t>
+            </a:r>
+            <a:r>
+              <a:rPr/>
+              <a:t> (</a:t>
+            </a:r>
+            <a:r>
+              <a:rPr b="1"/>
+              <a:t>p</a:t>
+            </a:r>
+            <a:r>
+              <a:rPr/>
+              <a:t>rint </a:t>
+            </a:r>
+            <a:r>
+              <a:rPr b="1"/>
+              <a:t>w</a:t>
+            </a:r>
+            <a:r>
+              <a:rPr/>
+              <a:t>orking </a:t>
+            </a:r>
+            <a:r>
+              <a:rPr b="1"/>
+              <a:t>d</a:t>
+            </a:r>
+            <a:r>
+              <a:rPr/>
+              <a:t>irectory).</a:t>
+            </a:r>
+          </a:p>
+          <a:p>
+            <a:pPr lvl="2"/>
+            <a:r>
+              <a:rPr/>
+              <a:t>Shows directory or “folder” you are currently operating in. This is not necessarily the same as the </a:t>
+            </a:r>
+            <a:r>
+              <a:rPr sz="1800">
+                <a:latin typeface="Courier"/>
+              </a:rPr>
+              <a:t>R</a:t>
+            </a:r>
+            <a:r>
+              <a:rPr/>
+              <a:t> working directory you get from </a:t>
+            </a:r>
+            <a:r>
+              <a:rPr sz="1800">
+                <a:latin typeface="Courier"/>
+              </a:rPr>
+              <a:t>getwd()</a:t>
+            </a:r>
+            <a:r>
+              <a:rPr/>
+              <a:t>.</a:t>
+            </a:r>
+          </a:p>
+          <a:p>
+            <a:pPr lvl="1"/>
+            <a:r>
+              <a:rPr sz="1800">
+                <a:hlinkClick r:id="rId3"/>
+                <a:latin typeface="Courier"/>
+              </a:rPr>
+              <a:t>ls</a:t>
+            </a:r>
+            <a:r>
+              <a:rPr/>
+              <a:t> (</a:t>
+            </a:r>
+            <a:r>
+              <a:rPr b="1"/>
+              <a:t>l</a:t>
+            </a:r>
+            <a:r>
+              <a:rPr/>
+              <a:t>i</a:t>
+            </a:r>
+            <a:r>
+              <a:rPr b="1"/>
+              <a:t>s</a:t>
+            </a:r>
+            <a:r>
+              <a:rPr/>
+              <a:t>t files).</a:t>
+            </a:r>
+          </a:p>
+          <a:p>
+            <a:pPr lvl="2"/>
+            <a:r>
+              <a:rPr/>
+              <a:t>Shows the files in the current working directory. This is equivalent to looking at the files in your Finder/Explorer/File Manager. Use </a:t>
+            </a:r>
+            <a:r>
+              <a:rPr sz="1800">
+                <a:latin typeface="Courier"/>
+              </a:rPr>
+              <a:t>ls -a</a:t>
+            </a:r>
+            <a:r>
+              <a:rPr/>
+              <a:t> to also list hidden files, such as </a:t>
+            </a:r>
+            <a:r>
+              <a:rPr sz="1800">
+                <a:latin typeface="Courier"/>
+              </a:rPr>
+              <a:t>.Rhistory</a:t>
+            </a:r>
+            <a:r>
+              <a:rPr/>
+              <a:t> and </a:t>
+            </a:r>
+            <a:r>
+              <a:rPr sz="1800">
+                <a:latin typeface="Courier"/>
+              </a:rPr>
+              <a:t>.git</a:t>
+            </a:r>
+            <a:r>
+              <a:rPr/>
+              <a:t>.</a:t>
+            </a:r>
+          </a:p>
+          <a:p>
+            <a:pPr lvl="1"/>
+            <a:r>
+              <a:rPr sz="1800">
+                <a:hlinkClick r:id="rId4"/>
+                <a:latin typeface="Courier"/>
+              </a:rPr>
+              <a:t>cd</a:t>
+            </a:r>
+            <a:r>
+              <a:rPr/>
+              <a:t> (</a:t>
+            </a:r>
+            <a:r>
+              <a:rPr b="1"/>
+              <a:t>c</a:t>
+            </a:r>
+            <a:r>
+              <a:rPr/>
+              <a:t>hange </a:t>
+            </a:r>
+            <a:r>
+              <a:rPr b="1"/>
+              <a:t>d</a:t>
+            </a:r>
+            <a:r>
+              <a:rPr/>
+              <a:t>irectory).</a:t>
+            </a:r>
+          </a:p>
+          <a:p>
+            <a:pPr lvl="2"/>
+            <a:r>
+              <a:rPr/>
+              <a:t>Allows you to navigate through your directories by changing the shell’s working directory. You can navigate like so:</a:t>
+            </a:r>
+          </a:p>
+          <a:p>
+            <a:pPr lvl="2"/>
+            <a:r>
+              <a:rPr/>
+              <a:t>go to subdirectory </a:t>
+            </a:r>
+            <a:r>
+              <a:rPr sz="1800">
+                <a:latin typeface="Courier"/>
+              </a:rPr>
+              <a:t>foo</a:t>
+            </a:r>
+            <a:r>
+              <a:rPr/>
+              <a:t> of current working directory: </a:t>
+            </a:r>
+            <a:r>
+              <a:rPr sz="1800">
+                <a:latin typeface="Courier"/>
+              </a:rPr>
+              <a:t>cd foo</a:t>
+            </a:r>
+          </a:p>
+          <a:p>
+            <a:pPr lvl="2"/>
+            <a:r>
+              <a:rPr/>
+              <a:t>go to parent of current working directory: </a:t>
+            </a:r>
+            <a:r>
+              <a:rPr sz="1800">
+                <a:latin typeface="Courier"/>
+              </a:rPr>
+              <a:t>cd ..</a:t>
+            </a:r>
+          </a:p>
+          <a:p>
+            <a:pPr lvl="2"/>
+            <a:r>
+              <a:rPr/>
+              <a:t>go to your “home” directory: simply </a:t>
+            </a:r>
+            <a:r>
+              <a:rPr sz="1800">
+                <a:latin typeface="Courier"/>
+              </a:rPr>
+              <a:t>cd</a:t>
+            </a:r>
+          </a:p>
+          <a:p>
+            <a:pPr lvl="2"/>
+            <a:r>
+              <a:rPr/>
+              <a:t>go to directory using absolute path, works regardless of your current working directory: </a:t>
+            </a:r>
+            <a:r>
+              <a:rPr sz="1800">
+                <a:latin typeface="Courier"/>
+              </a:rPr>
+              <a:t>cd /home/my_username/Desktop</a:t>
+            </a:r>
+            <a:r>
+              <a:rPr/>
+              <a:t>. Windows uses a slightly different syntax with the slashes between the folder names reversed, </a:t>
+            </a:r>
+            <a:r>
+              <a:rPr sz="1800">
+                <a:latin typeface="Courier"/>
+              </a:rPr>
+              <a:t>\</a:t>
+            </a:r>
+            <a:r>
+              <a:rPr/>
+              <a:t>, e.g. </a:t>
+            </a:r>
+            <a:r>
+              <a:rPr sz="1800">
+                <a:latin typeface="Courier"/>
+              </a:rPr>
+              <a:t>cd C:\Users\MY_USERNAME\Desktop</a:t>
+            </a:r>
+            <a:r>
+              <a:rPr/>
+              <a:t>.</a:t>
+            </a:r>
+          </a:p>
+          <a:p>
+            <a:pPr lvl="1"/>
+            <a:r>
+              <a:rPr/>
+              <a:t>Use arrow-up and arrow-down to repeat previous commands. Or search for previous commands with </a:t>
+            </a:r>
+            <a:r>
+              <a:rPr sz="1800">
+                <a:latin typeface="Courier"/>
+              </a:rPr>
+              <a:t>CTRL</a:t>
+            </a:r>
+            <a:r>
+              <a:rPr/>
+              <a:t> + </a:t>
+            </a:r>
+            <a:r>
+              <a:rPr sz="1800">
+                <a:latin typeface="Courier"/>
+              </a:rPr>
+              <a:t>r</a:t>
+            </a:r>
+            <a:r>
+              <a:rPr/>
+              <a:t>.</a:t>
+            </a:r>
+          </a:p>
+          <a:p>
+            <a:pPr lvl="1"/>
+            <a:r>
+              <a:rPr/>
+              <a:t>repository -</a:t>
+            </a:r>
+          </a:p>
+          <a:p>
+            <a:pPr lvl="1"/>
+            <a:r>
+              <a:rPr/>
+              <a:t>commit</a:t>
+            </a:r>
+          </a:p>
+          <a:p>
+            <a:pPr lvl="1"/>
+            <a:r>
+              <a:rPr/>
+              <a:t>dif</a:t>
+            </a:r>
+          </a:p>
+          <a:p>
+            <a:pPr lvl="0" marL="0" indent="0">
+              <a:buNone/>
+            </a:pPr>
+            <a:r>
+              <a:rPr i="1"/>
+              <a:t>“Never make fun of someone if they mispronounce a word. It means they learned it by reading” - Anonymous</a:t>
+            </a:r>
+          </a:p>
+        </p:txBody>
+      </p:sp>
+    </p:spTree>
+  </p:cSld>
+</p:sld>
+</file>
+
 <file path=ppt/slides/slide2.xml><?xml version="1.0" encoding="utf-8"?>
 <p:sld xmlns:a="http://schemas.openxmlformats.org/drawingml/2006/main" xmlns:r="http://schemas.openxmlformats.org/officeDocument/2006/relationships" xmlns:p="http://schemas.openxmlformats.org/presentationml/2006/main">
   <p:cSld>
@@ -3297,7 +3926,7 @@
             </a:pPr>
             <a:r>
               <a:rPr/>
-              <a:t>Welcome to Version Control week! </a:t>
+              <a:t>Welcome to Version Control week!</a:t>
             </a:r>
           </a:p>
         </p:txBody>
@@ -3324,106 +3953,36 @@
           <a:chExt cx="0" cy="0"/>
         </a:xfrm>
       </p:grpSpPr>
-      <p:sp>
-        <p:nvSpPr>
-          <p:cNvPr id="2" name="Title 1"/>
-          <p:cNvSpPr>
-            <a:spLocks noGrp="1"/>
-          </p:cNvSpPr>
-          <p:nvPr>
-            <p:ph type="title"/>
-          </p:nvPr>
-        </p:nvSpPr>
-        <p:spPr/>
-        <p:txBody>
-          <a:bodyPr/>
-          <a:lstStyle/>
-          <a:p>
-            <a:pPr lvl="0" marL="0" indent="0">
-              <a:buNone/>
-            </a:pPr>
-            <a:r>
-              <a:rPr/>
-              <a:t>Today’s</a:t>
-            </a:r>
-            <a:r>
-              <a:rPr/>
-              <a:t> </a:t>
-            </a:r>
-            <a:r>
-              <a:rPr/>
-              <a:t>Schedule</a:t>
-            </a:r>
-          </a:p>
-        </p:txBody>
-      </p:sp>
-      <p:sp>
-        <p:nvSpPr>
-          <p:cNvPr id="3" name="Content Placeholder 2"/>
-          <p:cNvSpPr>
-            <a:spLocks noGrp="1"/>
-          </p:cNvSpPr>
-          <p:nvPr>
-            <p:ph idx="1"/>
-          </p:nvPr>
-        </p:nvSpPr>
-        <p:spPr/>
-        <p:txBody>
-          <a:bodyPr/>
-          <a:lstStyle/>
-          <a:p>
-            <a:pPr lvl="1"/>
-            <a:r>
-              <a:rPr/>
-              <a:t>Discussion of readings</a:t>
-            </a:r>
-          </a:p>
-          <a:p>
-            <a:pPr lvl="1"/>
-            <a:r>
-              <a:rPr/>
-              <a:t>Important terms and concepts</a:t>
-            </a:r>
-          </a:p>
-          <a:p>
-            <a:pPr lvl="1"/>
-            <a:r>
-              <a:rPr/>
-              <a:t>Troubleshooting the installation of Git/Github/Rstudio</a:t>
-            </a:r>
-          </a:p>
-          <a:p>
-            <a:pPr lvl="1"/>
-            <a:r>
-              <a:rPr/>
-              <a:t>Work through two sections of happygitwithr.com</a:t>
-            </a:r>
-          </a:p>
-          <a:p>
-            <a:pPr lvl="2"/>
-            <a:r>
-              <a:rPr/>
-              <a:t>Connecting Git, GitHub, and RStudio!</a:t>
-            </a:r>
-          </a:p>
-          <a:p>
-            <a:pPr lvl="2"/>
-            <a:r>
-              <a:rPr/>
-              <a:t>Early Github Wins!</a:t>
-            </a:r>
-          </a:p>
-          <a:p>
-            <a:pPr lvl="0" marL="0" indent="0">
-              <a:buNone/>
-            </a:pPr>
-            <a:r>
-              <a:rPr/>
-              <a:t>Finish with Chapter 18, there will be some time to work on this at the end of the lecture.</a:t>
-            </a:r>
-          </a:p>
-        </p:txBody>
-      </p:sp>
+      <p:pic>
+        <p:nvPicPr>
+          <p:cNvPr descr="pres_figs/github_logo2.png" id="0" name="Picture 1"/>
+          <p:cNvPicPr>
+            <a:picLocks noGrp="1" noChangeAspect="1"/>
+          </p:cNvPicPr>
+          <p:nvPr/>
+        </p:nvPicPr>
+        <p:blipFill>
+          <a:blip r:embed="rId2"/>
+          <a:stretch>
+            <a:fillRect/>
+          </a:stretch>
+        </p:blipFill>
+        <p:spPr bwMode="auto">
+          <a:xfrm>
+            <a:off x="2070100" y="1600200"/>
+            <a:ext cx="5003800" cy="4521200"/>
+          </a:xfrm>
+          <a:prstGeom prst="rect">
+            <a:avLst/>
+          </a:prstGeom>
+          <a:noFill/>
+          <a:ln w="9525">
+            <a:noFill/>
+            <a:headEnd/>
+            <a:tailEnd/>
+          </a:ln>
+        </p:spPr>
+      </p:pic>
     </p:spTree>
   </p:cSld>
 </p:sld>
@@ -3448,12 +4007,12 @@
       </p:grpSpPr>
       <p:sp>
         <p:nvSpPr>
-          <p:cNvPr id="2" name="Title 1"/>
-          <p:cNvSpPr>
-            <a:spLocks noGrp="1"/>
-          </p:cNvSpPr>
-          <p:nvPr>
-            <p:ph type="title"/>
+          <p:cNvPr id="3" name="Content Placeholder 2"/>
+          <p:cNvSpPr>
+            <a:spLocks noGrp="1"/>
+          </p:cNvSpPr>
+          <p:nvPr>
+            <p:ph idx="1"/>
           </p:nvPr>
         </p:nvSpPr>
         <p:spPr/>
@@ -3464,57 +4023,14 @@
             <a:pPr lvl="0" marL="0" indent="0">
               <a:buNone/>
             </a:pPr>
-            <a:r>
-              <a:rPr/>
-              <a:t>Discussion</a:t>
-            </a:r>
-          </a:p>
-        </p:txBody>
-      </p:sp>
-      <p:sp>
-        <p:nvSpPr>
-          <p:cNvPr id="3" name="Content Placeholder 2"/>
-          <p:cNvSpPr>
-            <a:spLocks noGrp="1"/>
-          </p:cNvSpPr>
-          <p:nvPr>
-            <p:ph idx="1"/>
-          </p:nvPr>
-        </p:nvSpPr>
-        <p:spPr/>
-        <p:txBody>
-          <a:bodyPr/>
-          <a:lstStyle/>
+          </a:p>
           <a:p>
             <a:pPr lvl="0" marL="0" indent="0">
               <a:buNone/>
             </a:pPr>
             <a:r>
               <a:rPr/>
-              <a:t>You were asked to read</a:t>
-            </a:r>
-          </a:p>
-          <a:p>
-            <a:pPr lvl="1"/>
-            <a:r>
-              <a:rPr/>
-              <a:t>Sections 1-4 of Byran article (Excuse Me…)</a:t>
-            </a:r>
-          </a:p>
-          <a:p>
-            <a:pPr lvl="1"/>
-            <a:r>
-              <a:rPr/>
-              <a:t>Sewart Lowndes et al (Our path…)</a:t>
-            </a:r>
-          </a:p>
-          <a:p>
-            <a:pPr lvl="0" marL="0" indent="0">
-              <a:buNone/>
-            </a:pPr>
-            <a:r>
-              <a:rPr/>
-              <a:t>What were some of your intial takeaways from the readings?</a:t>
+              <a:t>In our lectures and excercises on version control with GitHub, we will largely utilize the Happy Git and GitHub for the useR by Jennifer Bryan @ happygitwithr.com</a:t>
             </a:r>
           </a:p>
         </p:txBody>
@@ -3561,7 +4077,15 @@
             </a:pPr>
             <a:r>
               <a:rPr/>
-              <a:t>Discussion</a:t>
+              <a:t>Today’s</a:t>
+            </a:r>
+            <a:r>
+              <a:rPr/>
+              <a:t> </a:t>
+            </a:r>
+            <a:r>
+              <a:rPr/>
+              <a:t>Schedule</a:t>
             </a:r>
           </a:p>
         </p:txBody>
@@ -3581,12 +4105,54 @@
           <a:bodyPr/>
           <a:lstStyle/>
           <a:p>
-            <a:pPr lvl="1">
-              <a:buAutoNum type="arabicPeriod"/>
+            <a:pPr lvl="1"/>
+            <a:r>
+              <a:rPr/>
+              <a:t>Discussion of readings</a:t>
+            </a:r>
+          </a:p>
+          <a:p>
+            <a:pPr lvl="1"/>
+            <a:r>
+              <a:rPr/>
+              <a:t>Troubleshooting the installation of Git/Github/Rstudio</a:t>
+            </a:r>
+          </a:p>
+          <a:p>
+            <a:pPr lvl="1"/>
+            <a:r>
+              <a:rPr/>
+              <a:t>Important terms and concepts</a:t>
+            </a:r>
+          </a:p>
+          <a:p>
+            <a:pPr lvl="1"/>
+            <a:r>
+              <a:rPr/>
+              <a:t>Work through two sections of happygitwithr.com</a:t>
+            </a:r>
+          </a:p>
+          <a:p>
+            <a:pPr lvl="2"/>
+            <a:r>
+              <a:rPr/>
+              <a:t>Connecting Git, GitHub, and RStudio!</a:t>
+            </a:r>
+          </a:p>
+          <a:p>
+            <a:pPr lvl="2"/>
+            <a:r>
+              <a:rPr/>
+              <a:t>Early Github Wins!</a:t>
+            </a:r>
+          </a:p>
+          <a:p>
+            <a:pPr lvl="0" marL="0" indent="0">
+              <a:buNone/>
             </a:pPr>
             <a:r>
               <a:rPr/>
-              <a:t>What the difference between Git and Github?</a:t>
+              <a:t>Finish with Chapter 18, there will be some time to work on this at the end of the lecture.</a:t>
             </a:r>
           </a:p>
         </p:txBody>
@@ -3638,6 +4204,63 @@
           </a:p>
         </p:txBody>
       </p:sp>
+      <p:sp>
+        <p:nvSpPr>
+          <p:cNvPr id="3" name="Content Placeholder 2"/>
+          <p:cNvSpPr>
+            <a:spLocks noGrp="1"/>
+          </p:cNvSpPr>
+          <p:nvPr>
+            <p:ph idx="1"/>
+          </p:nvPr>
+        </p:nvSpPr>
+        <p:spPr/>
+        <p:txBody>
+          <a:bodyPr/>
+          <a:lstStyle/>
+          <a:p>
+            <a:pPr lvl="0" marL="0" indent="0">
+              <a:buNone/>
+            </a:pPr>
+            <a:r>
+              <a:rPr/>
+              <a:t>You were asked to read</a:t>
+            </a:r>
+          </a:p>
+          <a:p>
+            <a:pPr lvl="1"/>
+            <a:r>
+              <a:rPr/>
+              <a:t>Sections 1-4 of Byran article (Excuse Me…)</a:t>
+            </a:r>
+          </a:p>
+          <a:p>
+            <a:pPr lvl="1"/>
+            <a:r>
+              <a:rPr/>
+              <a:t>Stewart Lowndes et al (Our path…)</a:t>
+            </a:r>
+          </a:p>
+          <a:p>
+            <a:pPr lvl="0" marL="0" indent="0">
+              <a:buNone/>
+            </a:pPr>
+            <a:r>
+              <a:rPr/>
+              <a:t>*What were your takeaways from the Bryan article?</a:t>
+            </a:r>
+          </a:p>
+          <a:p>
+            <a:pPr lvl="0" marL="0" indent="0">
+              <a:buNone/>
+            </a:pPr>
+            <a:r>
+              <a:rPr/>
+              <a:t>*What were your takeaways from the Stewart Lowndes article?</a:t>
+            </a:r>
+          </a:p>
+        </p:txBody>
+      </p:sp>
     </p:spTree>
   </p:cSld>
 </p:sld>
@@ -3682,6 +4305,14 @@
               <a:rPr/>
               <a:t>Discussion</a:t>
             </a:r>
+            <a:r>
+              <a:rPr/>
+              <a:t> </a:t>
+            </a:r>
+            <a:r>
+              <a:rPr/>
+              <a:t>Questions</a:t>
+            </a:r>
           </a:p>
         </p:txBody>
       </p:sp>
@@ -3700,20 +4331,12 @@
           <a:bodyPr/>
           <a:lstStyle/>
           <a:p>
-            <a:pPr lvl="1">
-              <a:buAutoNum type="arabicPeriod"/>
+            <a:pPr lvl="0" marL="0" indent="0">
+              <a:buNone/>
             </a:pPr>
             <a:r>
-              <a:rPr/>
-              <a:t>In the </a:t>
-            </a:r>
-            <a:r>
-              <a:rPr i="1"/>
-              <a:t>Our path…</a:t>
-            </a:r>
-            <a:r>
-              <a:rPr/>
-              <a:t> article, the authors discuss the implementation of version control/reproducibility (via Github and RStudio) in their large OHI project. How do you see version control/reproducability being implemented in your research?</a:t>
+              <a:rPr b="1"/>
+              <a:t>1. What the difference between Git and Github?</a:t>
             </a:r>
           </a:p>
         </p:txBody>
@@ -3760,7 +4383,7 @@
             </a:pPr>
             <a:r>
               <a:rPr/>
-              <a:t>Version</a:t>
+              <a:t>Discussion</a:t>
             </a:r>
             <a:r>
               <a:rPr/>
@@ -3768,7 +4391,7 @@
             </a:r>
             <a:r>
               <a:rPr/>
-              <a:t>Control</a:t>
+              <a:t>Questions</a:t>
             </a:r>
           </a:p>
         </p:txBody>
@@ -3788,26 +4411,29 @@
           <a:bodyPr/>
           <a:lstStyle/>
           <a:p>
+            <a:pPr lvl="1">
+              <a:buAutoNum type="arabicPeriod"/>
+            </a:pPr>
+            <a:r>
+              <a:rPr/>
+              <a:t>What the difference between Git and Github?</a:t>
+            </a:r>
+          </a:p>
+          <a:p>
             <a:pPr lvl="0" marL="0" indent="0">
               <a:buNone/>
             </a:pPr>
             <a:r>
-              <a:rPr/>
-              <a:t>Who does version control help?</a:t>
-            </a:r>
-          </a:p>
-          <a:p>
-            <a:pPr lvl="1"/>
-            <a:r>
-              <a:rPr/>
-              <a:t>Remember, this can be future you.</a:t>
-            </a:r>
-          </a:p>
-          <a:p>
-            <a:pPr lvl="2"/>
-            <a:r>
-              <a:rPr/>
-              <a:t>for example, I started my master’s in 2016. We published an article for one of those research projects in 2020. One of the biggest headaches was trying to remember why and how I did things 3 years ago</a:t>
+              <a:rPr b="1"/>
+              <a:t>2. In the </a:t>
+            </a:r>
+            <a:r>
+              <a:rPr b="1" i="1"/>
+              <a:t>Our path…</a:t>
+            </a:r>
+            <a:r>
+              <a:rPr b="1"/>
+              <a:t> article, the authors discuss the implementation of version control/reproducibility (via Github and RStudio) in the global OHI assessment. How do you see version control/reproducability being implemented in your research?</a:t>
             </a:r>
           </a:p>
         </p:txBody>
@@ -3854,7 +4480,15 @@
             </a:pPr>
             <a:r>
               <a:rPr/>
-              <a:t>Terminology</a:t>
+              <a:t>Discussion</a:t>
+            </a:r>
+            <a:r>
+              <a:rPr/>
+              <a:t> </a:t>
+            </a:r>
+            <a:r>
+              <a:rPr/>
+              <a:t>Questions</a:t>
             </a:r>
           </a:p>
         </p:txBody>
@@ -3874,33 +4508,38 @@
           <a:bodyPr/>
           <a:lstStyle/>
           <a:p>
+            <a:pPr lvl="1">
+              <a:buAutoNum type="arabicPeriod"/>
+            </a:pPr>
+            <a:r>
+              <a:rPr/>
+              <a:t>What the difference between Git and Github?</a:t>
+            </a:r>
+          </a:p>
+          <a:p>
+            <a:pPr lvl="1">
+              <a:buAutoNum type="arabicPeriod"/>
+            </a:pPr>
+            <a:r>
+              <a:rPr/>
+              <a:t>In the </a:t>
+            </a:r>
+            <a:r>
+              <a:rPr i="1"/>
+              <a:t>Our path…</a:t>
+            </a:r>
+            <a:r>
+              <a:rPr/>
+              <a:t> article, the authors discuss the implementation of version control/reproducibility (via Github and RStudio) in the global OHI assessment. How do you see version control/reproducability being implemented in your research?</a:t>
+            </a:r>
+          </a:p>
+          <a:p>
             <a:pPr lvl="0" marL="0" indent="0">
               <a:buNone/>
             </a:pPr>
             <a:r>
-              <a:rPr i="1"/>
-              <a:t>“Never make fun of someone if they mispronounce a word. It means they learned it by reading” - Anonymous</a:t>
-            </a:r>
-          </a:p>
-          <a:p>
-            <a:pPr lvl="1"/>
-            <a:r>
-              <a:rPr/>
-              <a:t>repository -</a:t>
-            </a:r>
-          </a:p>
-          <a:p>
-            <a:pPr lvl="1"/>
-            <a:r>
-              <a:rPr/>
-              <a:t>commit</a:t>
-            </a:r>
-          </a:p>
-          <a:p>
-            <a:pPr lvl="1"/>
-            <a:r>
-              <a:rPr/>
-              <a:t>dif</a:t>
+              <a:rPr b="1"/>
+              <a:t>3. What do you think will be the largest obstacle to utilizing version control with GitHub?</a:t>
             </a:r>
           </a:p>
         </p:txBody>

</xml_diff>